<commit_message>
Update Mat's slides to use skimage function rather than scipy.misc.imread
</commit_message>
<xml_diff>
--- a/Day2/Slides/MLowe - Image Processing in Python.pptx
+++ b/Day2/Slides/MLowe - Image Processing in Python.pptx
@@ -144,7 +144,7 @@
   </p:defaultTextStyle>
   <p:extLst>
     <p:ext uri="{EFAFB233-063F-42B5-8137-9DF3F51BA10A}">
-      <p15:sldGuideLst xmlns:p15="http://schemas.microsoft.com/office/powerpoint/2012/main" xmlns="">
+      <p15:sldGuideLst xmlns:p15="http://schemas.microsoft.com/office/powerpoint/2012/main">
         <p15:guide id="1" orient="horz" pos="2160">
           <p15:clr>
             <a:srgbClr val="A4A3A4"/>
@@ -156,6 +156,20 @@
           </p15:clr>
         </p15:guide>
       </p15:sldGuideLst>
+    </p:ext>
+    <p:ext uri="{2D200454-40CA-4A62-9FC3-DE9A4176ACB9}">
+      <p15:notesGuideLst xmlns:p15="http://schemas.microsoft.com/office/powerpoint/2012/main">
+        <p15:guide id="1" orient="horz" pos="2880">
+          <p15:clr>
+            <a:srgbClr val="A4A3A4"/>
+          </p15:clr>
+        </p15:guide>
+        <p15:guide id="2" pos="2160">
+          <p15:clr>
+            <a:srgbClr val="A4A3A4"/>
+          </p15:clr>
+        </p15:guide>
+      </p15:notesGuideLst>
     </p:ext>
   </p:extLst>
 </p:presentation>
@@ -243,7 +257,7 @@
           <a:p>
             <a:fld id="{4CCFB2A3-DAD1-420E-BAE3-9CE9DD70DC79}" type="datetimeFigureOut">
               <a:rPr lang="en-GB" smtClean="0"/>
-              <a:t>16/01/2017</a:t>
+              <a:t>11/01/2021</a:t>
             </a:fld>
             <a:endParaRPr lang="en-GB"/>
           </a:p>
@@ -307,35 +321,35 @@
           <a:p>
             <a:pPr lvl="0"/>
             <a:r>
-              <a:rPr lang="en-US" smtClean="0"/>
+              <a:rPr lang="en-US"/>
               <a:t>Click to edit Master text styles</a:t>
             </a:r>
           </a:p>
           <a:p>
             <a:pPr lvl="1"/>
             <a:r>
-              <a:rPr lang="en-US" smtClean="0"/>
+              <a:rPr lang="en-US"/>
               <a:t>Second level</a:t>
             </a:r>
           </a:p>
           <a:p>
             <a:pPr lvl="2"/>
             <a:r>
-              <a:rPr lang="en-US" smtClean="0"/>
+              <a:rPr lang="en-US"/>
               <a:t>Third level</a:t>
             </a:r>
           </a:p>
           <a:p>
             <a:pPr lvl="3"/>
             <a:r>
-              <a:rPr lang="en-US" smtClean="0"/>
+              <a:rPr lang="en-US"/>
               <a:t>Fourth level</a:t>
             </a:r>
           </a:p>
           <a:p>
             <a:pPr lvl="4"/>
             <a:r>
-              <a:rPr lang="en-US" smtClean="0"/>
+              <a:rPr lang="en-US"/>
               <a:t>Fifth level</a:t>
             </a:r>
             <a:endParaRPr lang="en-GB"/>
@@ -642,7 +656,7 @@
           <a:p>
             <a:fld id="{1BD37275-1761-4E64-8D5E-B92EB4EEBF10}" type="datetimeFigureOut">
               <a:rPr lang="en-GB" smtClean="0"/>
-              <a:t>16/01/2017</a:t>
+              <a:t>11/01/2021</a:t>
             </a:fld>
             <a:endParaRPr lang="en-GB"/>
           </a:p>
@@ -700,13 +714,6 @@
   <p:clrMapOvr>
     <a:masterClrMapping/>
   </p:clrMapOvr>
-  <p:timing>
-    <p:tnLst>
-      <p:par>
-        <p:cTn id="1" dur="indefinite" restart="never" nodeType="tmRoot"/>
-      </p:par>
-    </p:tnLst>
-  </p:timing>
 </p:sldLayout>
 </file>
 
@@ -819,7 +826,7 @@
           <a:p>
             <a:fld id="{1BD37275-1761-4E64-8D5E-B92EB4EEBF10}" type="datetimeFigureOut">
               <a:rPr lang="en-GB" smtClean="0"/>
-              <a:t>16/01/2017</a:t>
+              <a:t>11/01/2021</a:t>
             </a:fld>
             <a:endParaRPr lang="en-GB"/>
           </a:p>
@@ -999,7 +1006,7 @@
           <a:p>
             <a:fld id="{1BD37275-1761-4E64-8D5E-B92EB4EEBF10}" type="datetimeFigureOut">
               <a:rPr lang="en-GB" smtClean="0"/>
-              <a:t>16/01/2017</a:t>
+              <a:t>11/01/2021</a:t>
             </a:fld>
             <a:endParaRPr lang="en-GB"/>
           </a:p>
@@ -1169,7 +1176,7 @@
           <a:p>
             <a:fld id="{1BD37275-1761-4E64-8D5E-B92EB4EEBF10}" type="datetimeFigureOut">
               <a:rPr lang="en-GB" smtClean="0"/>
-              <a:t>16/01/2017</a:t>
+              <a:t>11/01/2021</a:t>
             </a:fld>
             <a:endParaRPr lang="en-GB"/>
           </a:p>
@@ -1413,7 +1420,7 @@
           <a:p>
             <a:fld id="{1BD37275-1761-4E64-8D5E-B92EB4EEBF10}" type="datetimeFigureOut">
               <a:rPr lang="en-GB" smtClean="0"/>
-              <a:t>16/01/2017</a:t>
+              <a:t>11/01/2021</a:t>
             </a:fld>
             <a:endParaRPr lang="en-GB"/>
           </a:p>
@@ -1645,7 +1652,7 @@
           <a:p>
             <a:fld id="{1BD37275-1761-4E64-8D5E-B92EB4EEBF10}" type="datetimeFigureOut">
               <a:rPr lang="en-GB" smtClean="0"/>
-              <a:t>16/01/2017</a:t>
+              <a:t>11/01/2021</a:t>
             </a:fld>
             <a:endParaRPr lang="en-GB"/>
           </a:p>
@@ -2012,7 +2019,7 @@
           <a:p>
             <a:fld id="{1BD37275-1761-4E64-8D5E-B92EB4EEBF10}" type="datetimeFigureOut">
               <a:rPr lang="en-GB" smtClean="0"/>
-              <a:t>16/01/2017</a:t>
+              <a:t>11/01/2021</a:t>
             </a:fld>
             <a:endParaRPr lang="en-GB"/>
           </a:p>
@@ -2130,7 +2137,7 @@
           <a:p>
             <a:fld id="{1BD37275-1761-4E64-8D5E-B92EB4EEBF10}" type="datetimeFigureOut">
               <a:rPr lang="en-GB" smtClean="0"/>
-              <a:t>16/01/2017</a:t>
+              <a:t>11/01/2021</a:t>
             </a:fld>
             <a:endParaRPr lang="en-GB"/>
           </a:p>
@@ -2225,7 +2232,7 @@
           <a:p>
             <a:fld id="{1BD37275-1761-4E64-8D5E-B92EB4EEBF10}" type="datetimeFigureOut">
               <a:rPr lang="en-GB" smtClean="0"/>
-              <a:t>16/01/2017</a:t>
+              <a:t>11/01/2021</a:t>
             </a:fld>
             <a:endParaRPr lang="en-GB"/>
           </a:p>
@@ -2502,7 +2509,7 @@
           <a:p>
             <a:fld id="{1BD37275-1761-4E64-8D5E-B92EB4EEBF10}" type="datetimeFigureOut">
               <a:rPr lang="en-GB" smtClean="0"/>
-              <a:t>16/01/2017</a:t>
+              <a:t>11/01/2021</a:t>
             </a:fld>
             <a:endParaRPr lang="en-GB"/>
           </a:p>
@@ -2759,7 +2766,7 @@
           <a:p>
             <a:fld id="{1BD37275-1761-4E64-8D5E-B92EB4EEBF10}" type="datetimeFigureOut">
               <a:rPr lang="en-GB" smtClean="0"/>
-              <a:t>16/01/2017</a:t>
+              <a:t>11/01/2021</a:t>
             </a:fld>
             <a:endParaRPr lang="en-GB"/>
           </a:p>
@@ -2972,7 +2979,7 @@
           <a:p>
             <a:fld id="{1BD37275-1761-4E64-8D5E-B92EB4EEBF10}" type="datetimeFigureOut">
               <a:rPr lang="en-GB" smtClean="0"/>
-              <a:t>16/01/2017</a:t>
+              <a:t>11/01/2021</a:t>
             </a:fld>
             <a:endParaRPr lang="en-GB"/>
           </a:p>
@@ -3191,13 +3198,6 @@
     <p:sldLayoutId id="2147483670" r:id="rId10"/>
     <p:sldLayoutId id="2147483671" r:id="rId11"/>
   </p:sldLayoutIdLst>
-  <p:timing>
-    <p:tnLst>
-      <p:par>
-        <p:cTn id="1" dur="indefinite" restart="never" nodeType="tmRoot"/>
-      </p:par>
-    </p:tnLst>
-  </p:timing>
   <p:txStyles>
     <p:titleStyle>
       <a:lvl1pPr algn="l" defTabSz="914400" rtl="0" eaLnBrk="1" latinLnBrk="0" hangingPunct="1">
@@ -3561,13 +3561,6 @@
   <p:clrMapOvr>
     <a:masterClrMapping/>
   </p:clrMapOvr>
-  <p:timing>
-    <p:tnLst>
-      <p:par>
-        <p:cTn id="1" dur="indefinite" restart="never" nodeType="tmRoot"/>
-      </p:par>
-    </p:tnLst>
-  </p:timing>
 </p:sld>
 </file>
 
@@ -3639,13 +3632,6 @@
   <p:clrMapOvr>
     <a:masterClrMapping/>
   </p:clrMapOvr>
-  <p:timing>
-    <p:tnLst>
-      <p:par>
-        <p:cTn id="1" dur="indefinite" restart="never" nodeType="tmRoot"/>
-      </p:par>
-    </p:tnLst>
-  </p:timing>
 </p:sld>
 </file>
 
@@ -3761,13 +3747,6 @@
   <p:clrMapOvr>
     <a:masterClrMapping/>
   </p:clrMapOvr>
-  <p:timing>
-    <p:tnLst>
-      <p:par>
-        <p:cTn id="1" dur="indefinite" restart="never" nodeType="tmRoot"/>
-      </p:par>
-    </p:tnLst>
-  </p:timing>
 </p:sld>
 </file>
 
@@ -4002,13 +3981,6 @@
   <p:clrMapOvr>
     <a:masterClrMapping/>
   </p:clrMapOvr>
-  <p:timing>
-    <p:tnLst>
-      <p:par>
-        <p:cTn id="1" dur="indefinite" restart="never" nodeType="tmRoot"/>
-      </p:par>
-    </p:tnLst>
-  </p:timing>
 </p:sld>
 </file>
 
@@ -4099,10 +4071,6 @@
               </a:rPr>
               <a:t>=(5,5)</a:t>
             </a:r>
-            <a:r>
-              <a:rPr lang="en-GB" dirty="0"/>
-              <a:t/>
-            </a:r>
             <a:br>
               <a:rPr lang="en-GB" dirty="0"/>
             </a:br>
@@ -4112,10 +4080,6 @@
             <a:pPr marL="0" indent="0">
               <a:buNone/>
             </a:pPr>
-            <a:r>
-              <a:rPr lang="en-GB" dirty="0"/>
-              <a:t/>
-            </a:r>
             <a:br>
               <a:rPr lang="en-GB" dirty="0"/>
             </a:br>
@@ -4240,13 +4204,6 @@
   <p:clrMapOvr>
     <a:masterClrMapping/>
   </p:clrMapOvr>
-  <p:timing>
-    <p:tnLst>
-      <p:par>
-        <p:cTn id="1" dur="indefinite" restart="never" nodeType="tmRoot"/>
-      </p:par>
-    </p:tnLst>
-  </p:timing>
 </p:sld>
 </file>
 
@@ -4580,7 +4537,7 @@
                 <a:latin typeface="Courier New" panose="02070309020205020404" pitchFamily="49" charset="0"/>
                 <a:cs typeface="Courier New" panose="02070309020205020404" pitchFamily="49" charset="0"/>
               </a:rPr>
-              <a:t>misc.imread</a:t>
+              <a:t>io.imread</a:t>
             </a:r>
             <a:r>
               <a:rPr lang="en-GB" sz="2000" dirty="0">
@@ -4597,11 +4554,18 @@
               <a:t>"bird.jpg“, </a:t>
             </a:r>
             <a:r>
+              <a:rPr lang="en-GB" sz="2000" dirty="0" err="1">
+                <a:latin typeface="Courier New" panose="02070309020205020404" pitchFamily="49" charset="0"/>
+                <a:cs typeface="Courier New" panose="02070309020205020404" pitchFamily="49" charset="0"/>
+              </a:rPr>
+              <a:t>as_gray</a:t>
+            </a:r>
+            <a:r>
               <a:rPr lang="en-GB" sz="2000" dirty="0">
                 <a:latin typeface="Courier New" panose="02070309020205020404" pitchFamily="49" charset="0"/>
                 <a:cs typeface="Courier New" panose="02070309020205020404" pitchFamily="49" charset="0"/>
               </a:rPr>
-              <a:t>flatten=True)</a:t>
+              <a:t>=True)</a:t>
             </a:r>
           </a:p>
         </p:txBody>
@@ -4616,13 +4580,6 @@
   <p:clrMapOvr>
     <a:masterClrMapping/>
   </p:clrMapOvr>
-  <p:timing>
-    <p:tnLst>
-      <p:par>
-        <p:cTn id="1" dur="indefinite" restart="never" nodeType="tmRoot"/>
-      </p:par>
-    </p:tnLst>
-  </p:timing>
 </p:sld>
 </file>
 
@@ -4904,13 +4861,6 @@
   <p:clrMapOvr>
     <a:masterClrMapping/>
   </p:clrMapOvr>
-  <p:timing>
-    <p:tnLst>
-      <p:par>
-        <p:cTn id="1" dur="indefinite" restart="never" nodeType="tmRoot"/>
-      </p:par>
-    </p:tnLst>
-  </p:timing>
 </p:sld>
 </file>
 
@@ -5010,13 +4960,6 @@
   <p:clrMapOvr>
     <a:masterClrMapping/>
   </p:clrMapOvr>
-  <p:timing>
-    <p:tnLst>
-      <p:par>
-        <p:cTn id="1" dur="indefinite" restart="never" nodeType="tmRoot"/>
-      </p:par>
-    </p:tnLst>
-  </p:timing>
 </p:sld>
 </file>
 
@@ -5643,13 +5586,6 @@
   <p:clrMapOvr>
     <a:masterClrMapping/>
   </p:clrMapOvr>
-  <p:timing>
-    <p:tnLst>
-      <p:par>
-        <p:cTn id="1" dur="indefinite" restart="never" nodeType="tmRoot"/>
-      </p:par>
-    </p:tnLst>
-  </p:timing>
 </p:sld>
 </file>
 
@@ -5787,13 +5723,6 @@
   <p:clrMapOvr>
     <a:masterClrMapping/>
   </p:clrMapOvr>
-  <p:timing>
-    <p:tnLst>
-      <p:par>
-        <p:cTn id="1" dur="indefinite" restart="never" nodeType="tmRoot"/>
-      </p:par>
-    </p:tnLst>
-  </p:timing>
 </p:sld>
 </file>
 
@@ -5925,13 +5854,6 @@
   <p:clrMapOvr>
     <a:masterClrMapping/>
   </p:clrMapOvr>
-  <p:timing>
-    <p:tnLst>
-      <p:par>
-        <p:cTn id="1" dur="indefinite" restart="never" nodeType="tmRoot"/>
-      </p:par>
-    </p:tnLst>
-  </p:timing>
 </p:sld>
 </file>
 
@@ -6202,13 +6124,6 @@
   <p:clrMapOvr>
     <a:masterClrMapping/>
   </p:clrMapOvr>
-  <p:timing>
-    <p:tnLst>
-      <p:par>
-        <p:cTn id="1" dur="indefinite" restart="never" nodeType="tmRoot"/>
-      </p:par>
-    </p:tnLst>
-  </p:timing>
 </p:sld>
 </file>
 
@@ -6340,13 +6255,6 @@
   <p:clrMapOvr>
     <a:masterClrMapping/>
   </p:clrMapOvr>
-  <p:timing>
-    <p:tnLst>
-      <p:par>
-        <p:cTn id="1" dur="indefinite" restart="never" nodeType="tmRoot"/>
-      </p:par>
-    </p:tnLst>
-  </p:timing>
 </p:sld>
 </file>
 
@@ -6543,13 +6451,6 @@
   <p:clrMapOvr>
     <a:masterClrMapping/>
   </p:clrMapOvr>
-  <p:timing>
-    <p:tnLst>
-      <p:par>
-        <p:cTn id="1" dur="indefinite" restart="never" nodeType="tmRoot"/>
-      </p:par>
-    </p:tnLst>
-  </p:timing>
 </p:sld>
 </file>
 
@@ -6662,13 +6563,6 @@
   <p:clrMapOvr>
     <a:masterClrMapping/>
   </p:clrMapOvr>
-  <p:timing>
-    <p:tnLst>
-      <p:par>
-        <p:cTn id="1" dur="indefinite" restart="never" nodeType="tmRoot"/>
-      </p:par>
-    </p:tnLst>
-  </p:timing>
 </p:sld>
 </file>
 
@@ -6737,7 +6631,7 @@
                 <a:latin typeface="Courier New" panose="02070309020205020404" pitchFamily="49" charset="0"/>
                 <a:cs typeface="Courier New" panose="02070309020205020404" pitchFamily="49" charset="0"/>
               </a:rPr>
-              <a:t>misc.imread</a:t>
+              <a:t>io.imread</a:t>
             </a:r>
             <a:r>
               <a:rPr lang="en-GB" dirty="0">
@@ -6759,13 +6653,6 @@
   <p:clrMapOvr>
     <a:masterClrMapping/>
   </p:clrMapOvr>
-  <p:timing>
-    <p:tnLst>
-      <p:par>
-        <p:cTn id="1" dur="indefinite" restart="never" nodeType="tmRoot"/>
-      </p:par>
-    </p:tnLst>
-  </p:timing>
 </p:sld>
 </file>
 
@@ -7187,13 +7074,6 @@
   <p:clrMapOvr>
     <a:masterClrMapping/>
   </p:clrMapOvr>
-  <p:timing>
-    <p:tnLst>
-      <p:par>
-        <p:cTn id="1" dur="indefinite" restart="never" nodeType="tmRoot"/>
-      </p:par>
-    </p:tnLst>
-  </p:timing>
 </p:sld>
 </file>
 
@@ -7276,13 +7156,6 @@
   <p:clrMapOvr>
     <a:masterClrMapping/>
   </p:clrMapOvr>
-  <p:timing>
-    <p:tnLst>
-      <p:par>
-        <p:cTn id="1" dur="indefinite" restart="never" nodeType="tmRoot"/>
-      </p:par>
-    </p:tnLst>
-  </p:timing>
 </p:sld>
 </file>
 
@@ -7603,13 +7476,6 @@
   <p:clrMapOvr>
     <a:masterClrMapping/>
   </p:clrMapOvr>
-  <p:timing>
-    <p:tnLst>
-      <p:par>
-        <p:cTn id="1" dur="indefinite" restart="never" nodeType="tmRoot"/>
-      </p:par>
-    </p:tnLst>
-  </p:timing>
 </p:sld>
 </file>
 
@@ -8205,13 +8071,6 @@
   <p:clrMapOvr>
     <a:masterClrMapping/>
   </p:clrMapOvr>
-  <p:timing>
-    <p:tnLst>
-      <p:par>
-        <p:cTn id="1" dur="indefinite" restart="never" nodeType="tmRoot"/>
-      </p:par>
-    </p:tnLst>
-  </p:timing>
 </p:sld>
 </file>
 
@@ -8397,13 +8256,6 @@
               </a:rPr>
               <a:t>plt</a:t>
             </a:r>
-            <a:r>
-              <a:rPr lang="en-GB" dirty="0">
-                <a:latin typeface="Courier New" panose="02070309020205020404" pitchFamily="49" charset="0"/>
-                <a:cs typeface="Courier New" panose="02070309020205020404" pitchFamily="49" charset="0"/>
-              </a:rPr>
-              <a:t/>
-            </a:r>
             <a:br>
               <a:rPr lang="en-GB" dirty="0">
                 <a:latin typeface="Courier New" panose="02070309020205020404" pitchFamily="49" charset="0"/>
@@ -8462,7 +8314,7 @@
                 <a:latin typeface="Courier New" panose="02070309020205020404" pitchFamily="49" charset="0"/>
                 <a:cs typeface="Courier New" panose="02070309020205020404" pitchFamily="49" charset="0"/>
               </a:rPr>
-              <a:t>scipy</a:t>
+              <a:t>skimage</a:t>
             </a:r>
             <a:r>
               <a:rPr lang="en-GB" dirty="0">
@@ -8479,15 +8331,11 @@
               <a:t>import </a:t>
             </a:r>
             <a:r>
-              <a:rPr lang="en-GB" dirty="0" err="1">
-                <a:latin typeface="Courier New" panose="02070309020205020404" pitchFamily="49" charset="0"/>
-                <a:cs typeface="Courier New" panose="02070309020205020404" pitchFamily="49" charset="0"/>
-              </a:rPr>
-              <a:t>misc</a:t>
-            </a:r>
-            <a:r>
-              <a:rPr lang="en-GB" dirty="0"/>
-              <a:t/>
+              <a:rPr lang="en-GB" dirty="0">
+                <a:latin typeface="Courier New" panose="02070309020205020404" pitchFamily="49" charset="0"/>
+                <a:cs typeface="Courier New" panose="02070309020205020404" pitchFamily="49" charset="0"/>
+              </a:rPr>
+              <a:t>io</a:t>
             </a:r>
             <a:br>
               <a:rPr lang="en-GB" dirty="0"/>
@@ -9050,13 +8898,6 @@
   <p:clrMapOvr>
     <a:masterClrMapping/>
   </p:clrMapOvr>
-  <p:timing>
-    <p:tnLst>
-      <p:par>
-        <p:cTn id="1" dur="indefinite" restart="never" nodeType="tmRoot"/>
-      </p:par>
-    </p:tnLst>
-  </p:timing>
 </p:sld>
 </file>
 
@@ -9126,13 +8967,13 @@
               <a:t> = </a:t>
             </a:r>
             <a:r>
-              <a:rPr lang="en-GB" dirty="0" err="1" smtClean="0">
+              <a:rPr lang="en-GB" dirty="0" err="1">
                 <a:latin typeface="Courier New" panose="02070309020205020404" pitchFamily="49" charset="0"/>
                 <a:cs typeface="Courier New" panose="02070309020205020404" pitchFamily="49" charset="0"/>
               </a:rPr>
               <a:t>shifted_image.shape</a:t>
             </a:r>
-            <a:endParaRPr lang="en-GB" dirty="0" smtClean="0">
+            <a:endParaRPr lang="en-GB" dirty="0">
               <a:latin typeface="Courier New" panose="02070309020205020404" pitchFamily="49" charset="0"/>
               <a:cs typeface="Courier New" panose="02070309020205020404" pitchFamily="49" charset="0"/>
             </a:endParaRPr>
@@ -9161,20 +9002,20 @@
           <a:lstStyle/>
           <a:p>
             <a:r>
-              <a:rPr lang="en-GB" sz="2400" dirty="0" smtClean="0"/>
+              <a:rPr lang="en-GB" sz="2400" dirty="0"/>
               <a:t>Remember, this gave us the array dimensions as a tuple.</a:t>
             </a:r>
           </a:p>
           <a:p>
             <a:r>
-              <a:rPr lang="en-GB" sz="2400" dirty="0" smtClean="0"/>
+              <a:rPr lang="en-GB" sz="2400" dirty="0"/>
               <a:t>We are now assigning these dimensions to the variables lx and </a:t>
             </a:r>
             <a:r>
-              <a:rPr lang="en-GB" sz="2400" dirty="0" err="1" smtClean="0"/>
+              <a:rPr lang="en-GB" sz="2400" dirty="0" err="1"/>
               <a:t>ly</a:t>
             </a:r>
-            <a:endParaRPr lang="en-GB" sz="2400" dirty="0" smtClean="0"/>
+            <a:endParaRPr lang="en-GB" sz="2400" dirty="0"/>
           </a:p>
           <a:p>
             <a:endParaRPr lang="en-GB" sz="2400" dirty="0"/>
@@ -9255,18 +9096,11 @@
           <a:lstStyle/>
           <a:p>
             <a:r>
-              <a:rPr lang="en-GB" dirty="0" smtClean="0">
-                <a:latin typeface="Courier New" panose="02070309020205020404" pitchFamily="49" charset="0"/>
-                <a:cs typeface="Courier New" panose="02070309020205020404" pitchFamily="49" charset="0"/>
-              </a:rPr>
-              <a:t>X</a:t>
-            </a:r>
-            <a:r>
               <a:rPr lang="en-GB" dirty="0">
                 <a:latin typeface="Courier New" panose="02070309020205020404" pitchFamily="49" charset="0"/>
                 <a:cs typeface="Courier New" panose="02070309020205020404" pitchFamily="49" charset="0"/>
               </a:rPr>
-              <a:t>, Y = </a:t>
+              <a:t>X, Y = </a:t>
             </a:r>
             <a:r>
               <a:rPr lang="en-GB" dirty="0" err="1">
@@ -9319,10 +9153,6 @@
               </a:rPr>
               <a:t> / 3</a:t>
             </a:r>
-            <a:endParaRPr lang="en-GB" dirty="0">
-              <a:latin typeface="Courier New" panose="02070309020205020404" pitchFamily="49" charset="0"/>
-              <a:cs typeface="Courier New" panose="02070309020205020404" pitchFamily="49" charset="0"/>
-            </a:endParaRPr>
           </a:p>
         </p:txBody>
       </p:sp>
@@ -9394,10 +9224,9 @@
           <a:lstStyle/>
           <a:p>
             <a:r>
-              <a:rPr lang="en-GB" sz="2400" dirty="0" smtClean="0"/>
+              <a:rPr lang="en-GB" sz="2400" dirty="0"/>
               <a:t>This gives us a grid with one horizontal array and one vertical array </a:t>
             </a:r>
-            <a:endParaRPr lang="en-GB" sz="2400" dirty="0"/>
           </a:p>
         </p:txBody>
       </p:sp>
@@ -9423,14 +9252,14 @@
           <a:lstStyle/>
           <a:p>
             <a:r>
-              <a:rPr lang="en-GB" sz="2400" dirty="0" smtClean="0"/>
+              <a:rPr lang="en-GB" sz="2400" dirty="0"/>
               <a:t>The mask is an inequality… It is also an array so it will be made out of Trues and </a:t>
             </a:r>
             <a:r>
-              <a:rPr lang="en-GB" sz="2400" dirty="0" err="1" smtClean="0"/>
+              <a:rPr lang="en-GB" sz="2400" dirty="0" err="1"/>
               <a:t>Falses</a:t>
             </a:r>
-            <a:endParaRPr lang="en-GB" sz="2400" dirty="0" smtClean="0"/>
+            <a:endParaRPr lang="en-GB" sz="2400" dirty="0"/>
           </a:p>
         </p:txBody>
       </p:sp>
@@ -9490,13 +9319,6 @@
   <p:clrMapOvr>
     <a:masterClrMapping/>
   </p:clrMapOvr>
-  <p:timing>
-    <p:tnLst>
-      <p:par>
-        <p:cTn id="1" dur="indefinite" restart="never" nodeType="tmRoot"/>
-      </p:par>
-    </p:tnLst>
-  </p:timing>
 </p:sld>
 </file>
 
@@ -9560,14 +9382,7 @@
                 <a:latin typeface="Courier New" panose="02070309020205020404" pitchFamily="49" charset="0"/>
                 <a:cs typeface="Courier New" panose="02070309020205020404" pitchFamily="49" charset="0"/>
               </a:rPr>
-              <a:t>[mask] = </a:t>
-            </a:r>
-            <a:r>
-              <a:rPr lang="en-GB" sz="2000" dirty="0" smtClean="0">
-                <a:latin typeface="Courier New" panose="02070309020205020404" pitchFamily="49" charset="0"/>
-                <a:cs typeface="Courier New" panose="02070309020205020404" pitchFamily="49" charset="0"/>
-              </a:rPr>
-              <a:t>0</a:t>
+              <a:t>[mask] = 0</a:t>
             </a:r>
             <a:endParaRPr lang="en-GB" dirty="0">
               <a:latin typeface="Courier New" panose="02070309020205020404" pitchFamily="49" charset="0"/>
@@ -9644,10 +9459,9 @@
           <a:lstStyle/>
           <a:p>
             <a:r>
-              <a:rPr lang="en-GB" sz="2800" dirty="0" smtClean="0"/>
+              <a:rPr lang="en-GB" sz="2800" dirty="0"/>
               <a:t>With this reference, we are only picking out the array elements that are True</a:t>
             </a:r>
-            <a:endParaRPr lang="en-GB" sz="2800" dirty="0"/>
           </a:p>
         </p:txBody>
       </p:sp>
@@ -9661,13 +9475,6 @@
   <p:clrMapOvr>
     <a:masterClrMapping/>
   </p:clrMapOvr>
-  <p:timing>
-    <p:tnLst>
-      <p:par>
-        <p:cTn id="1" dur="indefinite" restart="never" nodeType="tmRoot"/>
-      </p:par>
-    </p:tnLst>
-  </p:timing>
 </p:sld>
 </file>
 
@@ -9739,13 +9546,6 @@
   <p:clrMapOvr>
     <a:masterClrMapping/>
   </p:clrMapOvr>
-  <p:timing>
-    <p:tnLst>
-      <p:par>
-        <p:cTn id="1" dur="indefinite" restart="never" nodeType="tmRoot"/>
-      </p:par>
-    </p:tnLst>
-  </p:timing>
 </p:sld>
 </file>
 
@@ -9817,13 +9617,6 @@
   <p:clrMapOvr>
     <a:masterClrMapping/>
   </p:clrMapOvr>
-  <p:timing>
-    <p:tnLst>
-      <p:par>
-        <p:cTn id="1" dur="indefinite" restart="never" nodeType="tmRoot"/>
-      </p:par>
-    </p:tnLst>
-  </p:timing>
 </p:sld>
 </file>
 
@@ -9985,11 +9778,11 @@
           <a:lstStyle/>
           <a:p>
             <a:r>
-              <a:rPr lang="en-GB" sz="2800" dirty="0" smtClean="0"/>
+              <a:rPr lang="en-GB" sz="2800" dirty="0"/>
               <a:t>The standard deviation of the </a:t>
             </a:r>
             <a:r>
-              <a:rPr lang="en-GB" sz="2800" dirty="0" err="1" smtClean="0"/>
+              <a:rPr lang="en-GB" sz="2800" dirty="0" err="1"/>
               <a:t>gaussian</a:t>
             </a:r>
             <a:endParaRPr lang="en-GB" sz="2800" dirty="0"/>
@@ -10018,10 +9811,9 @@
           <a:lstStyle/>
           <a:p>
             <a:r>
-              <a:rPr lang="en-GB" sz="2800" dirty="0" smtClean="0"/>
+              <a:rPr lang="en-GB" sz="2800" dirty="0"/>
               <a:t>The image we want to blur</a:t>
             </a:r>
-            <a:endParaRPr lang="en-GB" sz="2800" dirty="0"/>
           </a:p>
         </p:txBody>
       </p:sp>
@@ -10093,14 +9885,9 @@
           <a:lstStyle/>
           <a:p>
             <a:r>
-              <a:rPr lang="en-GB" sz="2800" dirty="0" smtClean="0"/>
-              <a:t>We could achieve something similar by convolving with a Gaussian</a:t>
-            </a:r>
-            <a:r>
-              <a:rPr lang="en-GB" sz="2800" dirty="0" smtClean="0"/>
-              <a:t> similar to how you used convolution yesterday.</a:t>
-            </a:r>
-            <a:endParaRPr lang="en-GB" sz="2800" dirty="0"/>
+              <a:rPr lang="en-GB" sz="2800" dirty="0"/>
+              <a:t>We could achieve something similar by convolving with a Gaussian similar to how you used convolution yesterday.</a:t>
+            </a:r>
           </a:p>
         </p:txBody>
       </p:sp>
@@ -10114,13 +9901,6 @@
   <p:clrMapOvr>
     <a:masterClrMapping/>
   </p:clrMapOvr>
-  <p:timing>
-    <p:tnLst>
-      <p:par>
-        <p:cTn id="1" dur="indefinite" restart="never" nodeType="tmRoot"/>
-      </p:par>
-    </p:tnLst>
-  </p:timing>
 </p:sld>
 </file>
 
@@ -10205,13 +9985,6 @@
   <p:clrMapOvr>
     <a:masterClrMapping/>
   </p:clrMapOvr>
-  <p:timing>
-    <p:tnLst>
-      <p:par>
-        <p:cTn id="1" dur="indefinite" restart="never" nodeType="tmRoot"/>
-      </p:par>
-    </p:tnLst>
-  </p:timing>
 </p:sld>
 </file>
 
@@ -10301,13 +10074,6 @@
   <p:clrMapOvr>
     <a:masterClrMapping/>
   </p:clrMapOvr>
-  <p:timing>
-    <p:tnLst>
-      <p:par>
-        <p:cTn id="1" dur="indefinite" restart="never" nodeType="tmRoot"/>
-      </p:par>
-    </p:tnLst>
-  </p:timing>
 </p:sld>
 </file>
 
@@ -10337,7 +10103,7 @@
         <p:spPr>
           <a:xfrm>
             <a:off x="988306" y="1943319"/>
-            <a:ext cx="6843540" cy="523220"/>
+            <a:ext cx="8132354" cy="523220"/>
           </a:xfrm>
           <a:prstGeom prst="rect">
             <a:avLst/>
@@ -10367,7 +10133,7 @@
                 <a:latin typeface="Courier New" panose="02070309020205020404" pitchFamily="49" charset="0"/>
                 <a:cs typeface="Courier New" panose="02070309020205020404" pitchFamily="49" charset="0"/>
               </a:rPr>
-              <a:t>misc.imread</a:t>
+              <a:t>skimage.io.imread</a:t>
             </a:r>
             <a:r>
               <a:rPr lang="en-GB" sz="2800" dirty="0">
@@ -10466,15 +10232,7 @@
             </a:r>
             <a:r>
               <a:rPr lang="en-GB" sz="2400" dirty="0"/>
-              <a:t> belongs to the ‘</a:t>
-            </a:r>
-            <a:r>
-              <a:rPr lang="en-GB" sz="2400" dirty="0" err="1"/>
-              <a:t>misc</a:t>
-            </a:r>
-            <a:r>
-              <a:rPr lang="en-GB" sz="2400" dirty="0"/>
-              <a:t>’ namespace</a:t>
+              <a:t> belongs to the ‘io’ namespace</a:t>
             </a:r>
           </a:p>
         </p:txBody>
@@ -10671,13 +10429,6 @@
   <p:clrMapOvr>
     <a:masterClrMapping/>
   </p:clrMapOvr>
-  <p:timing>
-    <p:tnLst>
-      <p:par>
-        <p:cTn id="1" dur="indefinite" restart="never" nodeType="tmRoot"/>
-      </p:par>
-    </p:tnLst>
-  </p:timing>
 </p:sld>
 </file>
 
@@ -11063,13 +10814,6 @@
   <p:clrMapOvr>
     <a:masterClrMapping/>
   </p:clrMapOvr>
-  <p:timing>
-    <p:tnLst>
-      <p:par>
-        <p:cTn id="1" dur="indefinite" restart="never" nodeType="tmRoot"/>
-      </p:par>
-    </p:tnLst>
-  </p:timing>
 </p:sld>
 </file>
 
@@ -11277,13 +11021,6 @@
   <p:clrMapOvr>
     <a:masterClrMapping/>
   </p:clrMapOvr>
-  <p:timing>
-    <p:tnLst>
-      <p:par>
-        <p:cTn id="1" dur="indefinite" restart="never" nodeType="tmRoot"/>
-      </p:par>
-    </p:tnLst>
-  </p:timing>
 </p:sld>
 </file>
 
@@ -11368,13 +11105,6 @@
   <p:clrMapOvr>
     <a:masterClrMapping/>
   </p:clrMapOvr>
-  <p:timing>
-    <p:tnLst>
-      <p:par>
-        <p:cTn id="1" dur="indefinite" restart="never" nodeType="tmRoot"/>
-      </p:par>
-    </p:tnLst>
-  </p:timing>
 </p:sld>
 </file>
 
@@ -11438,13 +11168,6 @@
             <a:pPr marL="0" indent="0">
               <a:buNone/>
             </a:pPr>
-            <a:r>
-              <a:rPr lang="en-GB" dirty="0">
-                <a:latin typeface="Courier New" panose="02070309020205020404" pitchFamily="49" charset="0"/>
-                <a:cs typeface="Courier New" panose="02070309020205020404" pitchFamily="49" charset="0"/>
-              </a:rPr>
-              <a:t/>
-            </a:r>
             <a:br>
               <a:rPr lang="en-GB" dirty="0">
                 <a:latin typeface="Courier New" panose="02070309020205020404" pitchFamily="49" charset="0"/>
@@ -11763,13 +11486,6 @@
   <p:clrMapOvr>
     <a:masterClrMapping/>
   </p:clrMapOvr>
-  <p:timing>
-    <p:tnLst>
-      <p:par>
-        <p:cTn id="1" dur="indefinite" restart="never" nodeType="tmRoot"/>
-      </p:par>
-    </p:tnLst>
-  </p:timing>
 </p:sld>
 </file>
 
@@ -11848,13 +11564,6 @@
                 <a:cs typeface="Courier New" panose="02070309020205020404" pitchFamily="49" charset="0"/>
               </a:rPr>
             </a:br>
-            <a:r>
-              <a:rPr lang="en-GB" dirty="0">
-                <a:latin typeface="Courier New" panose="02070309020205020404" pitchFamily="49" charset="0"/>
-                <a:cs typeface="Courier New" panose="02070309020205020404" pitchFamily="49" charset="0"/>
-              </a:rPr>
-              <a:t/>
-            </a:r>
             <a:br>
               <a:rPr lang="en-GB" dirty="0">
                 <a:latin typeface="Courier New" panose="02070309020205020404" pitchFamily="49" charset="0"/>
@@ -11976,13 +11685,6 @@
                 <a:cs typeface="Courier New" panose="02070309020205020404" pitchFamily="49" charset="0"/>
               </a:rPr>
             </a:br>
-            <a:r>
-              <a:rPr lang="en-GB" dirty="0">
-                <a:latin typeface="Courier New" panose="02070309020205020404" pitchFamily="49" charset="0"/>
-                <a:cs typeface="Courier New" panose="02070309020205020404" pitchFamily="49" charset="0"/>
-              </a:rPr>
-              <a:t/>
-            </a:r>
             <a:br>
               <a:rPr lang="en-GB" dirty="0">
                 <a:latin typeface="Courier New" panose="02070309020205020404" pitchFamily="49" charset="0"/>
@@ -12556,13 +12258,6 @@
   <p:clrMapOvr>
     <a:masterClrMapping/>
   </p:clrMapOvr>
-  <p:timing>
-    <p:tnLst>
-      <p:par>
-        <p:cTn id="1" dur="indefinite" restart="never" nodeType="tmRoot"/>
-      </p:par>
-    </p:tnLst>
-  </p:timing>
 </p:sld>
 </file>
 
@@ -12821,7 +12516,7 @@
   <a:extraClrSchemeLst/>
   <a:extLst>
     <a:ext uri="{05A4C25C-085E-4340-85A3-A5531E510DB2}">
-      <thm15:themeFamily xmlns:thm15="http://schemas.microsoft.com/office/thememl/2012/main" xmlns="" name="Office Theme" id="{62F939B6-93AF-4DB8-9C6B-D6C7DFDC589F}" vid="{4A3C46E8-61CC-4603-A589-7422A47A8E4A}"/>
+      <thm15:themeFamily xmlns:thm15="http://schemas.microsoft.com/office/thememl/2012/main" name="Office Theme" id="{62F939B6-93AF-4DB8-9C6B-D6C7DFDC589F}" vid="{4A3C46E8-61CC-4603-A589-7422A47A8E4A}"/>
     </a:ext>
   </a:extLst>
 </a:theme>

</xml_diff>